<commit_message>
add elevation map to presentation and folder
</commit_message>
<xml_diff>
--- a/docs/Mexico Disease.pptx
+++ b/docs/Mexico Disease.pptx
@@ -4528,7 +4528,7 @@
           </a:ln>
           <a:extLst>
             <a:ext uri="{C572A759-6A51-4108-AA02-DFA0A04FC94B}">
-              <ma14:wrappingTextBoxFlag xmlns:ma14="http://schemas.microsoft.com/office/mac/drawingml/2011/main" xmlns="" val="1"/>
+              <ma14:wrappingTextBoxFlag xmlns="" xmlns:ma14="http://schemas.microsoft.com/office/mac/drawingml/2011/main" val="1"/>
             </a:ext>
           </a:extLst>
         </p:spPr>
@@ -4769,42 +4769,6 @@
           <a:chExt cx="0" cy="0"/>
         </a:xfrm>
       </p:grpSpPr>
-      <p:pic>
-        <p:nvPicPr>
-          <p:cNvPr id="5" name="Picture 4">
-            <a:extLst>
-              <a:ext uri="{FF2B5EF4-FFF2-40B4-BE49-F238E27FC236}">
-                <a16:creationId xmlns:a16="http://schemas.microsoft.com/office/drawing/2014/main" id="{5FD32103-A474-4246-BE58-2748EDC4FB27}"/>
-              </a:ext>
-            </a:extLst>
-          </p:cNvPr>
-          <p:cNvPicPr>
-            <a:picLocks noChangeAspect="1"/>
-          </p:cNvPicPr>
-          <p:nvPr/>
-        </p:nvPicPr>
-        <p:blipFill>
-          <a:blip r:embed="rId2">
-            <a:extLst>
-              <a:ext uri="{28A0092B-C50C-407E-A947-70E740481C1C}">
-                <a14:useLocalDpi xmlns:a14="http://schemas.microsoft.com/office/drawing/2010/main" val="0"/>
-              </a:ext>
-            </a:extLst>
-          </a:blip>
-          <a:stretch>
-            <a:fillRect/>
-          </a:stretch>
-        </p:blipFill>
-        <p:spPr>
-          <a:xfrm>
-            <a:off x="700149" y="1328529"/>
-            <a:ext cx="4760842" cy="4760842"/>
-          </a:xfrm>
-          <a:prstGeom prst="rect">
-            <a:avLst/>
-          </a:prstGeom>
-        </p:spPr>
-      </p:pic>
       <p:sp>
         <p:nvSpPr>
           <p:cNvPr id="6" name="TextBox 5">
@@ -5027,6 +4991,148 @@
           </a:fontRef>
         </p:style>
       </p:cxnSp>
+      <p:pic>
+        <p:nvPicPr>
+          <p:cNvPr id="4" name="Picture 3" descr="A picture containing blur&#10;&#10;Description generated with very high confidence">
+            <a:extLst>
+              <a:ext uri="{FF2B5EF4-FFF2-40B4-BE49-F238E27FC236}">
+                <a16:creationId xmlns:a16="http://schemas.microsoft.com/office/drawing/2014/main" id="{48144B19-9505-45A3-B61A-62587A4CBB0F}"/>
+              </a:ext>
+            </a:extLst>
+          </p:cNvPr>
+          <p:cNvPicPr>
+            <a:picLocks noChangeAspect="1"/>
+          </p:cNvPicPr>
+          <p:nvPr/>
+        </p:nvPicPr>
+        <p:blipFill>
+          <a:blip r:embed="rId2">
+            <a:extLst>
+              <a:ext uri="{28A0092B-C50C-407E-A947-70E740481C1C}">
+                <a14:useLocalDpi xmlns:a14="http://schemas.microsoft.com/office/drawing/2010/main" val="0"/>
+              </a:ext>
+            </a:extLst>
+          </a:blip>
+          <a:stretch>
+            <a:fillRect/>
+          </a:stretch>
+        </p:blipFill>
+        <p:spPr>
+          <a:xfrm>
+            <a:off x="2576945" y="3656506"/>
+            <a:ext cx="2785052" cy="2785052"/>
+          </a:xfrm>
+          <a:prstGeom prst="rect">
+            <a:avLst/>
+          </a:prstGeom>
+        </p:spPr>
+      </p:pic>
+      <p:pic>
+        <p:nvPicPr>
+          <p:cNvPr id="5" name="Picture 4">
+            <a:extLst>
+              <a:ext uri="{FF2B5EF4-FFF2-40B4-BE49-F238E27FC236}">
+                <a16:creationId xmlns:a16="http://schemas.microsoft.com/office/drawing/2014/main" id="{5FD32103-A474-4246-BE58-2748EDC4FB27}"/>
+              </a:ext>
+            </a:extLst>
+          </p:cNvPr>
+          <p:cNvPicPr>
+            <a:picLocks noChangeAspect="1"/>
+          </p:cNvPicPr>
+          <p:nvPr/>
+        </p:nvPicPr>
+        <p:blipFill>
+          <a:blip r:embed="rId3">
+            <a:extLst>
+              <a:ext uri="{28A0092B-C50C-407E-A947-70E740481C1C}">
+                <a14:useLocalDpi xmlns:a14="http://schemas.microsoft.com/office/drawing/2010/main" val="0"/>
+              </a:ext>
+            </a:extLst>
+          </a:blip>
+          <a:stretch>
+            <a:fillRect/>
+          </a:stretch>
+        </p:blipFill>
+        <p:spPr>
+          <a:xfrm>
+            <a:off x="700148" y="1249015"/>
+            <a:ext cx="3101311" cy="3101311"/>
+          </a:xfrm>
+          <a:prstGeom prst="rect">
+            <a:avLst/>
+          </a:prstGeom>
+        </p:spPr>
+      </p:pic>
+      <p:sp>
+        <p:nvSpPr>
+          <p:cNvPr id="8" name="TextBox 7">
+            <a:extLst>
+              <a:ext uri="{FF2B5EF4-FFF2-40B4-BE49-F238E27FC236}">
+                <a16:creationId xmlns:a16="http://schemas.microsoft.com/office/drawing/2014/main" id="{8ED50128-9835-4442-8273-7BBC200BF361}"/>
+              </a:ext>
+            </a:extLst>
+          </p:cNvPr>
+          <p:cNvSpPr txBox="1"/>
+          <p:nvPr/>
+        </p:nvSpPr>
+        <p:spPr>
+          <a:xfrm>
+            <a:off x="1552477" y="6089371"/>
+            <a:ext cx="1034473" cy="369332"/>
+          </a:xfrm>
+          <a:prstGeom prst="rect">
+            <a:avLst/>
+          </a:prstGeom>
+          <a:noFill/>
+        </p:spPr>
+        <p:txBody>
+          <a:bodyPr wrap="square" rtlCol="0">
+            <a:spAutoFit/>
+          </a:bodyPr>
+          <a:lstStyle/>
+          <a:p>
+            <a:r>
+              <a:rPr lang="en-US" dirty="0"/>
+              <a:t>altitude</a:t>
+            </a:r>
+          </a:p>
+        </p:txBody>
+      </p:sp>
+      <p:sp>
+        <p:nvSpPr>
+          <p:cNvPr id="9" name="TextBox 8">
+            <a:extLst>
+              <a:ext uri="{FF2B5EF4-FFF2-40B4-BE49-F238E27FC236}">
+                <a16:creationId xmlns:a16="http://schemas.microsoft.com/office/drawing/2014/main" id="{C3A6E41D-4218-4F7F-AA64-00CBC0021E24}"/>
+              </a:ext>
+            </a:extLst>
+          </p:cNvPr>
+          <p:cNvSpPr txBox="1"/>
+          <p:nvPr/>
+        </p:nvSpPr>
+        <p:spPr>
+          <a:xfrm>
+            <a:off x="645498" y="4350326"/>
+            <a:ext cx="1627416" cy="369332"/>
+          </a:xfrm>
+          <a:prstGeom prst="rect">
+            <a:avLst/>
+          </a:prstGeom>
+          <a:noFill/>
+        </p:spPr>
+        <p:txBody>
+          <a:bodyPr wrap="square" rtlCol="0">
+            <a:spAutoFit/>
+          </a:bodyPr>
+          <a:lstStyle/>
+          <a:p>
+            <a:r>
+              <a:rPr lang="en-US" dirty="0"/>
+              <a:t>population</a:t>
+            </a:r>
+          </a:p>
+        </p:txBody>
+      </p:sp>
     </p:spTree>
     <p:extLst>
       <p:ext uri="{BB962C8B-B14F-4D97-AF65-F5344CB8AC3E}">
@@ -10156,7 +10262,7 @@
           </a:ln>
           <a:extLst>
             <a:ext uri="{C572A759-6A51-4108-AA02-DFA0A04FC94B}">
-              <ma14:wrappingTextBoxFlag xmlns:ma14="http://schemas.microsoft.com/office/mac/drawingml/2011/main" xmlns="" val="1"/>
+              <ma14:wrappingTextBoxFlag xmlns="" xmlns:ma14="http://schemas.microsoft.com/office/mac/drawingml/2011/main" val="1"/>
             </a:ext>
           </a:extLst>
         </p:spPr>
@@ -10224,7 +10330,7 @@
           </a:ln>
           <a:extLst>
             <a:ext uri="{C572A759-6A51-4108-AA02-DFA0A04FC94B}">
-              <ma14:wrappingTextBoxFlag xmlns:ma14="http://schemas.microsoft.com/office/mac/drawingml/2011/main" xmlns="" val="1"/>
+              <ma14:wrappingTextBoxFlag xmlns="" xmlns:ma14="http://schemas.microsoft.com/office/mac/drawingml/2011/main" val="1"/>
             </a:ext>
           </a:extLst>
         </p:spPr>
@@ -10324,7 +10430,7 @@
           </a:ln>
           <a:extLst>
             <a:ext uri="{C572A759-6A51-4108-AA02-DFA0A04FC94B}">
-              <ma14:wrappingTextBoxFlag xmlns:ma14="http://schemas.microsoft.com/office/mac/drawingml/2011/main" xmlns="" val="1"/>
+              <ma14:wrappingTextBoxFlag xmlns="" xmlns:ma14="http://schemas.microsoft.com/office/mac/drawingml/2011/main" val="1"/>
             </a:ext>
           </a:extLst>
         </p:spPr>
@@ -10385,7 +10491,7 @@
           </a:ln>
           <a:extLst>
             <a:ext uri="{C572A759-6A51-4108-AA02-DFA0A04FC94B}">
-              <ma14:wrappingTextBoxFlag xmlns:ma14="http://schemas.microsoft.com/office/mac/drawingml/2011/main" xmlns="" val="1"/>
+              <ma14:wrappingTextBoxFlag xmlns="" xmlns:ma14="http://schemas.microsoft.com/office/mac/drawingml/2011/main" val="1"/>
             </a:ext>
           </a:extLst>
         </p:spPr>
@@ -10437,7 +10543,7 @@
           </a:ln>
           <a:extLst>
             <a:ext uri="{C572A759-6A51-4108-AA02-DFA0A04FC94B}">
-              <ma14:wrappingTextBoxFlag xmlns:ma14="http://schemas.microsoft.com/office/mac/drawingml/2011/main" xmlns="" val="1"/>
+              <ma14:wrappingTextBoxFlag xmlns="" xmlns:ma14="http://schemas.microsoft.com/office/mac/drawingml/2011/main" val="1"/>
             </a:ext>
           </a:extLst>
         </p:spPr>
@@ -10483,7 +10589,7 @@
           </a:ln>
           <a:extLst>
             <a:ext uri="{C572A759-6A51-4108-AA02-DFA0A04FC94B}">
-              <ma14:wrappingTextBoxFlag xmlns:ma14="http://schemas.microsoft.com/office/mac/drawingml/2011/main" xmlns="" val="1"/>
+              <ma14:wrappingTextBoxFlag xmlns="" xmlns:ma14="http://schemas.microsoft.com/office/mac/drawingml/2011/main" val="1"/>
             </a:ext>
           </a:extLst>
         </p:spPr>
@@ -10523,7 +10629,7 @@
           </a:ln>
           <a:extLst>
             <a:ext uri="{C572A759-6A51-4108-AA02-DFA0A04FC94B}">
-              <ma14:wrappingTextBoxFlag xmlns:ma14="http://schemas.microsoft.com/office/mac/drawingml/2011/main" xmlns="" val="1"/>
+              <ma14:wrappingTextBoxFlag xmlns="" xmlns:ma14="http://schemas.microsoft.com/office/mac/drawingml/2011/main" val="1"/>
             </a:ext>
           </a:extLst>
         </p:spPr>
@@ -10646,7 +10752,7 @@
             </a:ln>
             <a:extLst>
               <a:ext uri="{C572A759-6A51-4108-AA02-DFA0A04FC94B}">
-                <ma14:wrappingTextBoxFlag xmlns:ma14="http://schemas.microsoft.com/office/mac/drawingml/2011/main" xmlns="" val="1"/>
+                <ma14:wrappingTextBoxFlag xmlns="" xmlns:ma14="http://schemas.microsoft.com/office/mac/drawingml/2011/main" val="1"/>
               </a:ext>
             </a:extLst>
           </p:spPr>
@@ -10682,7 +10788,7 @@
             </a:ln>
             <a:extLst>
               <a:ext uri="{C572A759-6A51-4108-AA02-DFA0A04FC94B}">
-                <ma14:wrappingTextBoxFlag xmlns:ma14="http://schemas.microsoft.com/office/mac/drawingml/2011/main" xmlns="" val="1"/>
+                <ma14:wrappingTextBoxFlag xmlns="" xmlns:ma14="http://schemas.microsoft.com/office/mac/drawingml/2011/main" val="1"/>
               </a:ext>
             </a:extLst>
           </p:spPr>
@@ -10790,7 +10896,7 @@
           </a:ln>
           <a:extLst>
             <a:ext uri="{C572A759-6A51-4108-AA02-DFA0A04FC94B}">
-              <ma14:wrappingTextBoxFlag xmlns:ma14="http://schemas.microsoft.com/office/mac/drawingml/2011/main" xmlns="" val="1"/>
+              <ma14:wrappingTextBoxFlag xmlns="" xmlns:ma14="http://schemas.microsoft.com/office/mac/drawingml/2011/main" val="1"/>
             </a:ext>
           </a:extLst>
         </p:spPr>
@@ -11027,7 +11133,7 @@
           </a:ln>
           <a:extLst>
             <a:ext uri="{C572A759-6A51-4108-AA02-DFA0A04FC94B}">
-              <ma14:wrappingTextBoxFlag xmlns:ma14="http://schemas.microsoft.com/office/mac/drawingml/2011/main" xmlns="" val="1"/>
+              <ma14:wrappingTextBoxFlag xmlns="" xmlns:ma14="http://schemas.microsoft.com/office/mac/drawingml/2011/main" val="1"/>
             </a:ext>
           </a:extLst>
         </p:spPr>

</xml_diff>

<commit_message>
put results files on results folder
</commit_message>
<xml_diff>
--- a/docs/Mexico Disease.pptx
+++ b/docs/Mexico Disease.pptx
@@ -248,7 +248,7 @@
           <a:p>
             <a:fld id="{3009028A-7D60-496F-B802-88ED35530384}" type="datetimeFigureOut">
               <a:rPr lang="en-US" smtClean="0"/>
-              <a:t>1/7/2018</a:t>
+              <a:t>07-Jan-18</a:t>
             </a:fld>
             <a:endParaRPr lang="en-US"/>
           </a:p>
@@ -1211,7 +1211,7 @@
           <a:p>
             <a:fld id="{FC651705-9AC5-4ACC-85F5-3EE35D2A53A1}" type="datetimeFigureOut">
               <a:rPr lang="en-US" smtClean="0"/>
-              <a:t>1/7/2018</a:t>
+              <a:t>07-Jan-18</a:t>
             </a:fld>
             <a:endParaRPr lang="en-US"/>
           </a:p>
@@ -1409,7 +1409,7 @@
           <a:p>
             <a:fld id="{FC651705-9AC5-4ACC-85F5-3EE35D2A53A1}" type="datetimeFigureOut">
               <a:rPr lang="en-US" smtClean="0"/>
-              <a:t>1/7/2018</a:t>
+              <a:t>07-Jan-18</a:t>
             </a:fld>
             <a:endParaRPr lang="en-US"/>
           </a:p>
@@ -1617,7 +1617,7 @@
           <a:p>
             <a:fld id="{FC651705-9AC5-4ACC-85F5-3EE35D2A53A1}" type="datetimeFigureOut">
               <a:rPr lang="en-US" smtClean="0"/>
-              <a:t>1/7/2018</a:t>
+              <a:t>07-Jan-18</a:t>
             </a:fld>
             <a:endParaRPr lang="en-US"/>
           </a:p>
@@ -1897,7 +1897,7 @@
           <a:p>
             <a:fld id="{FC651705-9AC5-4ACC-85F5-3EE35D2A53A1}" type="datetimeFigureOut">
               <a:rPr lang="en-US" smtClean="0"/>
-              <a:t>1/7/2018</a:t>
+              <a:t>07-Jan-18</a:t>
             </a:fld>
             <a:endParaRPr lang="en-US"/>
           </a:p>
@@ -2172,7 +2172,7 @@
           <a:p>
             <a:fld id="{FC651705-9AC5-4ACC-85F5-3EE35D2A53A1}" type="datetimeFigureOut">
               <a:rPr lang="en-US" smtClean="0"/>
-              <a:t>1/7/2018</a:t>
+              <a:t>07-Jan-18</a:t>
             </a:fld>
             <a:endParaRPr lang="en-US"/>
           </a:p>
@@ -2437,7 +2437,7 @@
           <a:p>
             <a:fld id="{FC651705-9AC5-4ACC-85F5-3EE35D2A53A1}" type="datetimeFigureOut">
               <a:rPr lang="en-US" smtClean="0"/>
-              <a:t>1/7/2018</a:t>
+              <a:t>07-Jan-18</a:t>
             </a:fld>
             <a:endParaRPr lang="en-US"/>
           </a:p>
@@ -2849,7 +2849,7 @@
           <a:p>
             <a:fld id="{FC651705-9AC5-4ACC-85F5-3EE35D2A53A1}" type="datetimeFigureOut">
               <a:rPr lang="en-US" smtClean="0"/>
-              <a:t>1/7/2018</a:t>
+              <a:t>07-Jan-18</a:t>
             </a:fld>
             <a:endParaRPr lang="en-US"/>
           </a:p>
@@ -2990,7 +2990,7 @@
           <a:p>
             <a:fld id="{FC651705-9AC5-4ACC-85F5-3EE35D2A53A1}" type="datetimeFigureOut">
               <a:rPr lang="en-US" smtClean="0"/>
-              <a:t>1/7/2018</a:t>
+              <a:t>07-Jan-18</a:t>
             </a:fld>
             <a:endParaRPr lang="en-US"/>
           </a:p>
@@ -3103,7 +3103,7 @@
           <a:p>
             <a:fld id="{FC651705-9AC5-4ACC-85F5-3EE35D2A53A1}" type="datetimeFigureOut">
               <a:rPr lang="en-US" smtClean="0"/>
-              <a:t>1/7/2018</a:t>
+              <a:t>07-Jan-18</a:t>
             </a:fld>
             <a:endParaRPr lang="en-US"/>
           </a:p>
@@ -3414,7 +3414,7 @@
           <a:p>
             <a:fld id="{FC651705-9AC5-4ACC-85F5-3EE35D2A53A1}" type="datetimeFigureOut">
               <a:rPr lang="en-US" smtClean="0"/>
-              <a:t>1/7/2018</a:t>
+              <a:t>07-Jan-18</a:t>
             </a:fld>
             <a:endParaRPr lang="en-US"/>
           </a:p>
@@ -3702,7 +3702,7 @@
           <a:p>
             <a:fld id="{FC651705-9AC5-4ACC-85F5-3EE35D2A53A1}" type="datetimeFigureOut">
               <a:rPr lang="en-US" smtClean="0"/>
-              <a:t>1/7/2018</a:t>
+              <a:t>07-Jan-18</a:t>
             </a:fld>
             <a:endParaRPr lang="en-US"/>
           </a:p>
@@ -3943,7 +3943,7 @@
           <a:p>
             <a:fld id="{FC651705-9AC5-4ACC-85F5-3EE35D2A53A1}" type="datetimeFigureOut">
               <a:rPr lang="en-US" smtClean="0"/>
-              <a:t>1/7/2018</a:t>
+              <a:t>07-Jan-18</a:t>
             </a:fld>
             <a:endParaRPr lang="en-US"/>
           </a:p>
@@ -4528,7 +4528,7 @@
           </a:ln>
           <a:extLst>
             <a:ext uri="{C572A759-6A51-4108-AA02-DFA0A04FC94B}">
-              <ma14:wrappingTextBoxFlag xmlns="" xmlns:ma14="http://schemas.microsoft.com/office/mac/drawingml/2011/main" val="1"/>
+              <ma14:wrappingTextBoxFlag xmlns:ma14="http://schemas.microsoft.com/office/mac/drawingml/2011/main" xmlns="" val="1"/>
             </a:ext>
           </a:extLst>
         </p:spPr>
@@ -10009,7 +10009,7 @@
           </a:ln>
           <a:extLst>
             <a:ext uri="{C572A759-6A51-4108-AA02-DFA0A04FC94B}">
-              <ma14:wrappingTextBoxFlag xmlns="" xmlns:ma14="http://schemas.microsoft.com/office/mac/drawingml/2011/main" val="1"/>
+              <ma14:wrappingTextBoxFlag xmlns:ma14="http://schemas.microsoft.com/office/mac/drawingml/2011/main" xmlns="" val="1"/>
             </a:ext>
           </a:extLst>
         </p:spPr>
@@ -10077,7 +10077,7 @@
           </a:ln>
           <a:extLst>
             <a:ext uri="{C572A759-6A51-4108-AA02-DFA0A04FC94B}">
-              <ma14:wrappingTextBoxFlag xmlns="" xmlns:ma14="http://schemas.microsoft.com/office/mac/drawingml/2011/main" val="1"/>
+              <ma14:wrappingTextBoxFlag xmlns:ma14="http://schemas.microsoft.com/office/mac/drawingml/2011/main" xmlns="" val="1"/>
             </a:ext>
           </a:extLst>
         </p:spPr>
@@ -10177,7 +10177,7 @@
           </a:ln>
           <a:extLst>
             <a:ext uri="{C572A759-6A51-4108-AA02-DFA0A04FC94B}">
-              <ma14:wrappingTextBoxFlag xmlns="" xmlns:ma14="http://schemas.microsoft.com/office/mac/drawingml/2011/main" val="1"/>
+              <ma14:wrappingTextBoxFlag xmlns:ma14="http://schemas.microsoft.com/office/mac/drawingml/2011/main" xmlns="" val="1"/>
             </a:ext>
           </a:extLst>
         </p:spPr>
@@ -10238,7 +10238,7 @@
           </a:ln>
           <a:extLst>
             <a:ext uri="{C572A759-6A51-4108-AA02-DFA0A04FC94B}">
-              <ma14:wrappingTextBoxFlag xmlns="" xmlns:ma14="http://schemas.microsoft.com/office/mac/drawingml/2011/main" val="1"/>
+              <ma14:wrappingTextBoxFlag xmlns:ma14="http://schemas.microsoft.com/office/mac/drawingml/2011/main" xmlns="" val="1"/>
             </a:ext>
           </a:extLst>
         </p:spPr>
@@ -10290,7 +10290,7 @@
           </a:ln>
           <a:extLst>
             <a:ext uri="{C572A759-6A51-4108-AA02-DFA0A04FC94B}">
-              <ma14:wrappingTextBoxFlag xmlns="" xmlns:ma14="http://schemas.microsoft.com/office/mac/drawingml/2011/main" val="1"/>
+              <ma14:wrappingTextBoxFlag xmlns:ma14="http://schemas.microsoft.com/office/mac/drawingml/2011/main" xmlns="" val="1"/>
             </a:ext>
           </a:extLst>
         </p:spPr>
@@ -10336,7 +10336,7 @@
           </a:ln>
           <a:extLst>
             <a:ext uri="{C572A759-6A51-4108-AA02-DFA0A04FC94B}">
-              <ma14:wrappingTextBoxFlag xmlns="" xmlns:ma14="http://schemas.microsoft.com/office/mac/drawingml/2011/main" val="1"/>
+              <ma14:wrappingTextBoxFlag xmlns:ma14="http://schemas.microsoft.com/office/mac/drawingml/2011/main" xmlns="" val="1"/>
             </a:ext>
           </a:extLst>
         </p:spPr>
@@ -10376,7 +10376,7 @@
           </a:ln>
           <a:extLst>
             <a:ext uri="{C572A759-6A51-4108-AA02-DFA0A04FC94B}">
-              <ma14:wrappingTextBoxFlag xmlns="" xmlns:ma14="http://schemas.microsoft.com/office/mac/drawingml/2011/main" val="1"/>
+              <ma14:wrappingTextBoxFlag xmlns:ma14="http://schemas.microsoft.com/office/mac/drawingml/2011/main" xmlns="" val="1"/>
             </a:ext>
           </a:extLst>
         </p:spPr>
@@ -10499,7 +10499,7 @@
             </a:ln>
             <a:extLst>
               <a:ext uri="{C572A759-6A51-4108-AA02-DFA0A04FC94B}">
-                <ma14:wrappingTextBoxFlag xmlns="" xmlns:ma14="http://schemas.microsoft.com/office/mac/drawingml/2011/main" val="1"/>
+                <ma14:wrappingTextBoxFlag xmlns:ma14="http://schemas.microsoft.com/office/mac/drawingml/2011/main" xmlns="" val="1"/>
               </a:ext>
             </a:extLst>
           </p:spPr>
@@ -10535,7 +10535,7 @@
             </a:ln>
             <a:extLst>
               <a:ext uri="{C572A759-6A51-4108-AA02-DFA0A04FC94B}">
-                <ma14:wrappingTextBoxFlag xmlns="" xmlns:ma14="http://schemas.microsoft.com/office/mac/drawingml/2011/main" val="1"/>
+                <ma14:wrappingTextBoxFlag xmlns:ma14="http://schemas.microsoft.com/office/mac/drawingml/2011/main" xmlns="" val="1"/>
               </a:ext>
             </a:extLst>
           </p:spPr>
@@ -10643,7 +10643,7 @@
           </a:ln>
           <a:extLst>
             <a:ext uri="{C572A759-6A51-4108-AA02-DFA0A04FC94B}">
-              <ma14:wrappingTextBoxFlag xmlns="" xmlns:ma14="http://schemas.microsoft.com/office/mac/drawingml/2011/main" val="1"/>
+              <ma14:wrappingTextBoxFlag xmlns:ma14="http://schemas.microsoft.com/office/mac/drawingml/2011/main" xmlns="" val="1"/>
             </a:ext>
           </a:extLst>
         </p:spPr>
@@ -10880,7 +10880,7 @@
           </a:ln>
           <a:extLst>
             <a:ext uri="{C572A759-6A51-4108-AA02-DFA0A04FC94B}">
-              <ma14:wrappingTextBoxFlag xmlns="" xmlns:ma14="http://schemas.microsoft.com/office/mac/drawingml/2011/main" val="1"/>
+              <ma14:wrappingTextBoxFlag xmlns:ma14="http://schemas.microsoft.com/office/mac/drawingml/2011/main" xmlns="" val="1"/>
             </a:ext>
           </a:extLst>
         </p:spPr>

</xml_diff>